<commit_message>
hide slide about SRP + DIP. it interrupts narrative thread
</commit_message>
<xml_diff>
--- a/di.pptx
+++ b/di.pptx
@@ -2467,6 +2467,13 @@
         </dgm:presLayoutVars>
       </dgm:prSet>
       <dgm:spPr/>
+      <dgm:t>
+        <a:bodyPr/>
+        <a:lstStyle/>
+        <a:p>
+          <a:endParaRPr lang="ru-RU"/>
+        </a:p>
+      </dgm:t>
     </dgm:pt>
     <dgm:pt modelId="{CF6D50B3-578A-4EA0-A5A0-492FA729F6ED}" type="pres">
       <dgm:prSet presAssocID="{B75F6A3A-9A51-4DF3-8A57-9AEB0739425C}" presName="composite" presStyleCnt="0"/>
@@ -2479,6 +2486,13 @@
         </dgm:presLayoutVars>
       </dgm:prSet>
       <dgm:spPr/>
+      <dgm:t>
+        <a:bodyPr/>
+        <a:lstStyle/>
+        <a:p>
+          <a:endParaRPr lang="ru-RU"/>
+        </a:p>
+      </dgm:t>
     </dgm:pt>
     <dgm:pt modelId="{61EB78D8-69FF-471D-8FEB-71388C442F55}" type="pres">
       <dgm:prSet presAssocID="{B75F6A3A-9A51-4DF3-8A57-9AEB0739425C}" presName="rect1" presStyleLbl="alignImgPlace1" presStyleIdx="0" presStyleCnt="1" custScaleX="596594" custScaleY="114980" custLinFactX="-64576" custLinFactNeighborX="-100000" custLinFactNeighborY="-13065"/>
@@ -2500,9 +2514,9 @@
     </dgm:pt>
   </dgm:ptLst>
   <dgm:cxnLst>
+    <dgm:cxn modelId="{017518C9-1619-4B19-AA03-86BA999BA287}" srcId="{EAB81984-5B84-4970-8447-2B456B8C58DF}" destId="{B75F6A3A-9A51-4DF3-8A57-9AEB0739425C}" srcOrd="0" destOrd="0" parTransId="{203596AF-4F49-40BA-B1E1-11BDD34B512E}" sibTransId="{A056157B-3867-49A4-9195-F3A4F3FBBA8E}"/>
     <dgm:cxn modelId="{1CEAA455-5BF4-4666-95B8-390900AB8124}" type="presOf" srcId="{EAB81984-5B84-4970-8447-2B456B8C58DF}" destId="{3A252E36-3D7E-49E5-B812-EE4CACF0D5CF}" srcOrd="0" destOrd="0" presId="urn:microsoft.com/office/officeart/2008/layout/PictureGrid"/>
     <dgm:cxn modelId="{147A14B3-96E8-4139-969B-9DB1BCB4D95E}" type="presOf" srcId="{B75F6A3A-9A51-4DF3-8A57-9AEB0739425C}" destId="{B29ABF60-EC0F-45AD-A90E-9C76D15C2F14}" srcOrd="0" destOrd="0" presId="urn:microsoft.com/office/officeart/2008/layout/PictureGrid"/>
-    <dgm:cxn modelId="{017518C9-1619-4B19-AA03-86BA999BA287}" srcId="{EAB81984-5B84-4970-8447-2B456B8C58DF}" destId="{B75F6A3A-9A51-4DF3-8A57-9AEB0739425C}" srcOrd="0" destOrd="0" parTransId="{203596AF-4F49-40BA-B1E1-11BDD34B512E}" sibTransId="{A056157B-3867-49A4-9195-F3A4F3FBBA8E}"/>
     <dgm:cxn modelId="{D3458AFA-605E-43EE-8C8A-0E0C1E3CD931}" type="presParOf" srcId="{3A252E36-3D7E-49E5-B812-EE4CACF0D5CF}" destId="{CF6D50B3-578A-4EA0-A5A0-492FA729F6ED}" srcOrd="0" destOrd="0" presId="urn:microsoft.com/office/officeart/2008/layout/PictureGrid"/>
     <dgm:cxn modelId="{9835F3F3-3E30-4AC4-AD89-BC095FA9A878}" type="presParOf" srcId="{CF6D50B3-578A-4EA0-A5A0-492FA729F6ED}" destId="{B29ABF60-EC0F-45AD-A90E-9C76D15C2F14}" srcOrd="0" destOrd="0" presId="urn:microsoft.com/office/officeart/2008/layout/PictureGrid"/>
     <dgm:cxn modelId="{70FA379F-7827-49B9-806E-1FD72CAE8F89}" type="presParOf" srcId="{CF6D50B3-578A-4EA0-A5A0-492FA729F6ED}" destId="{61EB78D8-69FF-471D-8FEB-71388C442F55}" srcOrd="1" destOrd="0" presId="urn:microsoft.com/office/officeart/2008/layout/PictureGrid"/>
@@ -2574,6 +2588,13 @@
         </dgm:presLayoutVars>
       </dgm:prSet>
       <dgm:spPr/>
+      <dgm:t>
+        <a:bodyPr/>
+        <a:lstStyle/>
+        <a:p>
+          <a:endParaRPr lang="ru-RU"/>
+        </a:p>
+      </dgm:t>
     </dgm:pt>
     <dgm:pt modelId="{CF6D50B3-578A-4EA0-A5A0-492FA729F6ED}" type="pres">
       <dgm:prSet presAssocID="{B75F6A3A-9A51-4DF3-8A57-9AEB0739425C}" presName="composite" presStyleCnt="0"/>
@@ -2586,6 +2607,13 @@
         </dgm:presLayoutVars>
       </dgm:prSet>
       <dgm:spPr/>
+      <dgm:t>
+        <a:bodyPr/>
+        <a:lstStyle/>
+        <a:p>
+          <a:endParaRPr lang="ru-RU"/>
+        </a:p>
+      </dgm:t>
     </dgm:pt>
     <dgm:pt modelId="{61EB78D8-69FF-471D-8FEB-71388C442F55}" type="pres">
       <dgm:prSet presAssocID="{B75F6A3A-9A51-4DF3-8A57-9AEB0739425C}" presName="rect1" presStyleLbl="alignImgPlace1" presStyleIdx="0" presStyleCnt="1" custScaleX="596594" custScaleY="114980" custLinFactX="-64576" custLinFactNeighborX="-100000" custLinFactNeighborY="-13065"/>
@@ -2607,9 +2635,9 @@
     </dgm:pt>
   </dgm:ptLst>
   <dgm:cxnLst>
+    <dgm:cxn modelId="{017518C9-1619-4B19-AA03-86BA999BA287}" srcId="{EAB81984-5B84-4970-8447-2B456B8C58DF}" destId="{B75F6A3A-9A51-4DF3-8A57-9AEB0739425C}" srcOrd="0" destOrd="0" parTransId="{203596AF-4F49-40BA-B1E1-11BDD34B512E}" sibTransId="{A056157B-3867-49A4-9195-F3A4F3FBBA8E}"/>
     <dgm:cxn modelId="{1CEAA455-5BF4-4666-95B8-390900AB8124}" type="presOf" srcId="{EAB81984-5B84-4970-8447-2B456B8C58DF}" destId="{3A252E36-3D7E-49E5-B812-EE4CACF0D5CF}" srcOrd="0" destOrd="0" presId="urn:microsoft.com/office/officeart/2008/layout/PictureGrid"/>
     <dgm:cxn modelId="{147A14B3-96E8-4139-969B-9DB1BCB4D95E}" type="presOf" srcId="{B75F6A3A-9A51-4DF3-8A57-9AEB0739425C}" destId="{B29ABF60-EC0F-45AD-A90E-9C76D15C2F14}" srcOrd="0" destOrd="0" presId="urn:microsoft.com/office/officeart/2008/layout/PictureGrid"/>
-    <dgm:cxn modelId="{017518C9-1619-4B19-AA03-86BA999BA287}" srcId="{EAB81984-5B84-4970-8447-2B456B8C58DF}" destId="{B75F6A3A-9A51-4DF3-8A57-9AEB0739425C}" srcOrd="0" destOrd="0" parTransId="{203596AF-4F49-40BA-B1E1-11BDD34B512E}" sibTransId="{A056157B-3867-49A4-9195-F3A4F3FBBA8E}"/>
     <dgm:cxn modelId="{D3458AFA-605E-43EE-8C8A-0E0C1E3CD931}" type="presParOf" srcId="{3A252E36-3D7E-49E5-B812-EE4CACF0D5CF}" destId="{CF6D50B3-578A-4EA0-A5A0-492FA729F6ED}" srcOrd="0" destOrd="0" presId="urn:microsoft.com/office/officeart/2008/layout/PictureGrid"/>
     <dgm:cxn modelId="{9835F3F3-3E30-4AC4-AD89-BC095FA9A878}" type="presParOf" srcId="{CF6D50B3-578A-4EA0-A5A0-492FA729F6ED}" destId="{B29ABF60-EC0F-45AD-A90E-9C76D15C2F14}" srcOrd="0" destOrd="0" presId="urn:microsoft.com/office/officeart/2008/layout/PictureGrid"/>
     <dgm:cxn modelId="{70FA379F-7827-49B9-806E-1FD72CAE8F89}" type="presParOf" srcId="{CF6D50B3-578A-4EA0-A5A0-492FA729F6ED}" destId="{61EB78D8-69FF-471D-8FEB-71388C442F55}" srcOrd="1" destOrd="0" presId="urn:microsoft.com/office/officeart/2008/layout/PictureGrid"/>
@@ -2699,6 +2727,13 @@
         </dgm:presLayoutVars>
       </dgm:prSet>
       <dgm:spPr/>
+      <dgm:t>
+        <a:bodyPr/>
+        <a:lstStyle/>
+        <a:p>
+          <a:endParaRPr lang="ru-RU"/>
+        </a:p>
+      </dgm:t>
     </dgm:pt>
     <dgm:pt modelId="{65D73C51-61AB-436D-8191-975603FC9C68}" type="pres">
       <dgm:prSet presAssocID="{9C9C0585-42CE-4F34-A2BB-F1377DA03788}" presName="composite" presStyleCnt="0"/>
@@ -2711,6 +2746,13 @@
         </dgm:presLayoutVars>
       </dgm:prSet>
       <dgm:spPr/>
+      <dgm:t>
+        <a:bodyPr/>
+        <a:lstStyle/>
+        <a:p>
+          <a:endParaRPr lang="ru-RU"/>
+        </a:p>
+      </dgm:t>
     </dgm:pt>
     <dgm:pt modelId="{DFDA3CA3-5C68-4A2F-A4A8-285063A35D87}" type="pres">
       <dgm:prSet presAssocID="{9C9C0585-42CE-4F34-A2BB-F1377DA03788}" presName="rect1" presStyleLbl="alignImgPlace1" presStyleIdx="0" presStyleCnt="1" custScaleX="62421" custScaleY="62421" custLinFactNeighborX="1076" custLinFactNeighborY="-52209"/>
@@ -2735,8 +2777,8 @@
     </dgm:pt>
   </dgm:ptLst>
   <dgm:cxnLst>
+    <dgm:cxn modelId="{A177C822-7566-4410-A889-706A6CE15148}" srcId="{8F66C165-B39F-46D3-B19F-623799541DD3}" destId="{9C9C0585-42CE-4F34-A2BB-F1377DA03788}" srcOrd="0" destOrd="0" parTransId="{4E5DCF2B-AAE7-41E2-837F-518128C03597}" sibTransId="{56F70C7F-1925-4DBA-9BD6-AF5E91799A59}"/>
     <dgm:cxn modelId="{A9E27516-E8E4-42A7-A155-024D48E79559}" type="presOf" srcId="{8F66C165-B39F-46D3-B19F-623799541DD3}" destId="{B6F028CB-F170-4FEF-BC3A-25F0E90D434A}" srcOrd="0" destOrd="0" presId="urn:microsoft.com/office/officeart/2008/layout/PictureGrid"/>
-    <dgm:cxn modelId="{A177C822-7566-4410-A889-706A6CE15148}" srcId="{8F66C165-B39F-46D3-B19F-623799541DD3}" destId="{9C9C0585-42CE-4F34-A2BB-F1377DA03788}" srcOrd="0" destOrd="0" parTransId="{4E5DCF2B-AAE7-41E2-837F-518128C03597}" sibTransId="{56F70C7F-1925-4DBA-9BD6-AF5E91799A59}"/>
     <dgm:cxn modelId="{ACD53F50-5BA1-48C9-B5DF-09BF6DA4DE65}" type="presOf" srcId="{9C9C0585-42CE-4F34-A2BB-F1377DA03788}" destId="{A30F2283-C0A4-4A69-BCBE-833D967155A2}" srcOrd="0" destOrd="0" presId="urn:microsoft.com/office/officeart/2008/layout/PictureGrid"/>
     <dgm:cxn modelId="{CC189C1C-06A1-4F03-B886-67BF46A53703}" type="presParOf" srcId="{B6F028CB-F170-4FEF-BC3A-25F0E90D434A}" destId="{65D73C51-61AB-436D-8191-975603FC9C68}" srcOrd="0" destOrd="0" presId="urn:microsoft.com/office/officeart/2008/layout/PictureGrid"/>
     <dgm:cxn modelId="{CD7DB92E-B84F-43A0-AC2D-FBBFB40722EE}" type="presParOf" srcId="{65D73C51-61AB-436D-8191-975603FC9C68}" destId="{A30F2283-C0A4-4A69-BCBE-833D967155A2}" srcOrd="0" destOrd="0" presId="urn:microsoft.com/office/officeart/2008/layout/PictureGrid"/>
@@ -2797,7 +2839,7 @@
         </a:bodyPr>
         <a:lstStyle/>
         <a:p>
-          <a:pPr marL="0" lvl="0" indent="0" algn="l" defTabSz="222250">
+          <a:pPr lvl="0" algn="l" defTabSz="222250">
             <a:lnSpc>
               <a:spcPct val="90000"/>
             </a:lnSpc>
@@ -2807,7 +2849,6 @@
             <a:spcAft>
               <a:spcPct val="35000"/>
             </a:spcAft>
-            <a:buNone/>
           </a:pPr>
           <a:r>
             <a:rPr lang="ru-RU" sz="500" kern="1200" dirty="0"/>
@@ -2921,7 +2962,7 @@
         </a:bodyPr>
         <a:lstStyle/>
         <a:p>
-          <a:pPr marL="0" lvl="0" indent="0" algn="l" defTabSz="222250">
+          <a:pPr lvl="0" algn="l" defTabSz="222250">
             <a:lnSpc>
               <a:spcPct val="90000"/>
             </a:lnSpc>
@@ -2931,7 +2972,6 @@
             <a:spcAft>
               <a:spcPct val="35000"/>
             </a:spcAft>
-            <a:buNone/>
           </a:pPr>
           <a:r>
             <a:rPr lang="ru-RU" sz="500" kern="1200" dirty="0"/>
@@ -3045,7 +3085,7 @@
         </a:bodyPr>
         <a:lstStyle/>
         <a:p>
-          <a:pPr marL="0" lvl="0" indent="0" algn="ctr" defTabSz="1778000">
+          <a:pPr lvl="0" algn="ctr" defTabSz="1778000">
             <a:lnSpc>
               <a:spcPct val="90000"/>
             </a:lnSpc>
@@ -3055,7 +3095,6 @@
             <a:spcAft>
               <a:spcPct val="35000"/>
             </a:spcAft>
-            <a:buNone/>
           </a:pPr>
           <a:r>
             <a:rPr lang="ru-RU" sz="4000" kern="1200" dirty="0">
@@ -7116,7 +7155,7 @@
           <a:p>
             <a:fld id="{98715375-4139-4C08-98FD-C8890076A179}" type="datetimeFigureOut">
               <a:rPr lang="ru-RU" smtClean="0"/>
-              <a:t>16.04.2018</a:t>
+              <a:t>21.11.2018</a:t>
             </a:fld>
             <a:endParaRPr lang="ru-RU"/>
           </a:p>
@@ -14834,6 +14873,13 @@
               </a:spcAft>
               <a:buNone/>
             </a:pPr>
+            <a:r>
+              <a:rPr lang="ru-RU" altLang="ru-RU" sz="2000" dirty="0">
+                <a:latin typeface="Consolas" panose="020B0609020204030204" pitchFamily="49" charset="0"/>
+                <a:cs typeface="Consolas" panose="020B0609020204030204" pitchFamily="49" charset="0"/>
+              </a:rPr>
+              <a:t/>
+            </a:r>
             <a:br>
               <a:rPr lang="ru-RU" altLang="ru-RU" sz="2000" dirty="0">
                 <a:latin typeface="Consolas" panose="020B0609020204030204" pitchFamily="49" charset="0"/>
@@ -17673,7 +17719,7 @@
                 <a14:useLocalDpi xmlns:a14="http://schemas.microsoft.com/office/drawing/2010/main" val="0"/>
               </a:ext>
               <a:ext uri="{96DAC541-7B7A-43D3-8B79-37D633B846F1}">
-                <asvg:svgBlip xmlns:asvg="http://schemas.microsoft.com/office/drawing/2016/SVG/main" r:embed="rId4"/>
+                <asvg:svgBlip xmlns:asvg="http://schemas.microsoft.com/office/drawing/2016/SVG/main" xmlns="" r:embed="rId4"/>
               </a:ext>
             </a:extLst>
           </a:blip>
@@ -17705,7 +17751,7 @@
 </file>
 
 <file path=ppt/slides/slide3.xml><?xml version="1.0" encoding="utf-8"?>
-<p:sld xmlns:a="http://schemas.openxmlformats.org/drawingml/2006/main" xmlns:r="http://schemas.openxmlformats.org/officeDocument/2006/relationships" xmlns:p="http://schemas.openxmlformats.org/presentationml/2006/main">
+<p:sld xmlns:a="http://schemas.openxmlformats.org/drawingml/2006/main" xmlns:r="http://schemas.openxmlformats.org/officeDocument/2006/relationships" xmlns:p="http://schemas.openxmlformats.org/presentationml/2006/main" show="0">
   <p:cSld>
     <p:spTree>
       <p:nvGrpSpPr>
@@ -19432,6 +19478,14 @@
   <p:clrMapOvr>
     <a:masterClrMapping/>
   </p:clrMapOvr>
+  <mc:AlternateContent xmlns:mc="http://schemas.openxmlformats.org/markup-compatibility/2006">
+    <mc:Choice xmlns:p14="http://schemas.microsoft.com/office/powerpoint/2010/main" Requires="p14">
+      <p:transition spd="slow" p14:dur="2000"/>
+    </mc:Choice>
+    <mc:Fallback>
+      <p:transition spd="slow"/>
+    </mc:Fallback>
+  </mc:AlternateContent>
   <p:timing>
     <p:tnLst>
       <p:par>
@@ -21019,6 +21073,13 @@
   <p:clrMapOvr>
     <a:masterClrMapping/>
   </p:clrMapOvr>
+  <p:timing>
+    <p:tnLst>
+      <p:par>
+        <p:cTn id="1" dur="indefinite" restart="never" nodeType="tmRoot"/>
+      </p:par>
+    </p:tnLst>
+  </p:timing>
 </p:sld>
 </file>
 
@@ -22462,6 +22523,14 @@
               </a:rPr>
               <a:t>В чем разница между</a:t>
             </a:r>
+            <a:r>
+              <a:rPr lang="ru-RU" dirty="0">
+                <a:solidFill>
+                  <a:schemeClr val="tx1"/>
+                </a:solidFill>
+              </a:rPr>
+              <a:t/>
+            </a:r>
             <a:br>
               <a:rPr lang="ru-RU" dirty="0">
                 <a:solidFill>
@@ -22481,6 +22550,14 @@
               <a:rPr lang="en-US" b="1" i="1" dirty="0"/>
               <a:t>Injection</a:t>
             </a:r>
+            <a:r>
+              <a:rPr lang="ru-RU" dirty="0">
+                <a:solidFill>
+                  <a:schemeClr val="tx1"/>
+                </a:solidFill>
+              </a:rPr>
+              <a:t/>
+            </a:r>
             <a:br>
               <a:rPr lang="ru-RU" dirty="0">
                 <a:solidFill>
@@ -22496,6 +22573,14 @@
               </a:rPr>
               <a:t>и</a:t>
             </a:r>
+            <a:r>
+              <a:rPr lang="en-US" dirty="0">
+                <a:solidFill>
+                  <a:schemeClr val="tx1"/>
+                </a:solidFill>
+              </a:rPr>
+              <a:t/>
+            </a:r>
             <a:br>
               <a:rPr lang="en-US" dirty="0">
                 <a:solidFill>
@@ -22522,6 +22607,14 @@
                 </a:solidFill>
               </a:rPr>
               <a:t> Principle</a:t>
+            </a:r>
+            <a:r>
+              <a:rPr lang="ru-RU" dirty="0">
+                <a:solidFill>
+                  <a:schemeClr val="tx1"/>
+                </a:solidFill>
+              </a:rPr>
+              <a:t/>
             </a:r>
             <a:br>
               <a:rPr lang="ru-RU" dirty="0">

</xml_diff>